<commit_message>
updates for Malvern event
</commit_message>
<xml_diff>
--- a/Presentations/AzureLabSetup.pptx
+++ b/Presentations/AzureLabSetup.pptx
@@ -3500,7 +3500,7 @@
         </p:spPr>
         <p:txBody>
           <a:bodyPr>
-            <a:normAutofit/>
+            <a:normAutofit fontScale="92500" lnSpcReduction="20000"/>
           </a:bodyPr>
           <a:lstStyle/>
           <a:p>
@@ -3528,6 +3528,19 @@
               <a:rPr lang="en-US" sz="4000" dirty="0"/>
               <a:t>Login Event ID (press blue button):  msevent298wg</a:t>
             </a:r>
+          </a:p>
+          <a:p>
+            <a:r>
+              <a:rPr lang="en-US" sz="4000"/>
+              <a:t>Lab Repo:  </a:t>
+            </a:r>
+            <a:r>
+              <a:rPr lang="en-US">
+                <a:hlinkClick r:id="rId2" tooltip="https://github.com/davew-msft/2019azuremigrateyourapps/invitations"/>
+              </a:rPr>
+              <a:t>https://github.com/davew-msft/2019AzureMigrateYourApps</a:t>
+            </a:r>
+            <a:endParaRPr lang="en-US" sz="4000" dirty="0"/>
           </a:p>
           <a:p>
             <a:r>
@@ -3571,7 +3584,7 @@
                     <a:lumMod val="75000"/>
                   </a:schemeClr>
                 </a:solidFill>
-                <a:hlinkClick r:id="rId2">
+                <a:hlinkClick r:id="rId3">
                   <a:extLst>
                     <a:ext uri="{A12FA001-AC4F-418D-AE19-62706E023703}">
                       <ahyp:hlinkClr xmlns:ahyp="http://schemas.microsoft.com/office/drawing/2018/hyperlinkcolor" val="tx"/>

</xml_diff>